<commit_message>
fix data object creation dialog
</commit_message>
<xml_diff>
--- a/presentation/presentation.pptx
+++ b/presentation/presentation.pptx
@@ -5,17 +5,19 @@
     <p:sldMasterId id="2147483660" r:id="rId1"/>
   </p:sldMasterIdLst>
   <p:notesMasterIdLst>
-    <p:notesMasterId r:id="rId8"/>
+    <p:notesMasterId r:id="rId10"/>
   </p:notesMasterIdLst>
   <p:sldIdLst>
     <p:sldId id="256" r:id="rId2"/>
     <p:sldId id="257" r:id="rId3"/>
-    <p:sldId id="259" r:id="rId4"/>
-    <p:sldId id="260" r:id="rId5"/>
-    <p:sldId id="258" r:id="rId6"/>
-    <p:sldId id="261" r:id="rId7"/>
+    <p:sldId id="262" r:id="rId4"/>
+    <p:sldId id="259" r:id="rId5"/>
+    <p:sldId id="260" r:id="rId6"/>
+    <p:sldId id="258" r:id="rId7"/>
+    <p:sldId id="261" r:id="rId8"/>
+    <p:sldId id="263" r:id="rId9"/>
   </p:sldIdLst>
-  <p:sldSz cx="9144000" cy="6858000" type="screen4x3"/>
+  <p:sldSz cx="12192000" cy="6858000"/>
   <p:notesSz cx="6858000" cy="9144000"/>
   <p:defaultTextStyle>
     <a:defPPr>
@@ -202,7 +204,7 @@
           <a:p>
             <a:fld id="{97654B1D-6E8F-4B2A-9B0B-F346A8212316}" type="datetimeFigureOut">
               <a:rPr lang="de-DE" smtClean="0"/>
-              <a:t>14.02.20</a:t>
+              <a:t>02.03.20</a:t>
             </a:fld>
             <a:endParaRPr lang="de-DE"/>
           </a:p>
@@ -220,8 +222,8 @@
         </p:nvSpPr>
         <p:spPr>
           <a:xfrm>
-            <a:off x="1371600" y="1143000"/>
-            <a:ext cx="4114800" cy="3086100"/>
+            <a:off x="685800" y="1143000"/>
+            <a:ext cx="5486400" cy="3086100"/>
           </a:xfrm>
           <a:prstGeom prst="rect">
             <a:avLst/>
@@ -512,8 +514,8 @@
         </p:blipFill>
         <p:spPr bwMode="auto">
           <a:xfrm>
-            <a:off x="87313" y="3662672"/>
-            <a:ext cx="9056687" cy="2924175"/>
+            <a:off x="116418" y="3662673"/>
+            <a:ext cx="12075583" cy="2924175"/>
           </a:xfrm>
           <a:prstGeom prst="rect">
             <a:avLst/>
@@ -557,7 +559,7 @@
         <p:spPr bwMode="auto">
           <a:xfrm>
             <a:off x="0" y="-3175"/>
-            <a:ext cx="9144000" cy="6870700"/>
+            <a:ext cx="12192000" cy="6870700"/>
           </a:xfrm>
           <a:prstGeom prst="rect">
             <a:avLst/>
@@ -603,8 +605,8 @@
         </p:nvSpPr>
         <p:spPr bwMode="auto">
           <a:xfrm>
-            <a:off x="385763" y="3296957"/>
-            <a:ext cx="6932612" cy="307777"/>
+            <a:off x="514351" y="3296958"/>
+            <a:ext cx="9243483" cy="307777"/>
           </a:xfrm>
           <a:prstGeom prst="rect">
             <a:avLst/>
@@ -781,8 +783,8 @@
         </p:nvSpPr>
         <p:spPr bwMode="auto">
           <a:xfrm>
-            <a:off x="396875" y="6552308"/>
-            <a:ext cx="3670300" cy="122238"/>
+            <a:off x="529167" y="6552308"/>
+            <a:ext cx="4893733" cy="122238"/>
           </a:xfrm>
           <a:prstGeom prst="rect">
             <a:avLst/>
@@ -925,8 +927,8 @@
         </p:nvSpPr>
         <p:spPr bwMode="auto">
           <a:xfrm>
-            <a:off x="7318375" y="6490081"/>
-            <a:ext cx="1727200" cy="244475"/>
+            <a:off x="9757834" y="6490082"/>
+            <a:ext cx="2302933" cy="244475"/>
           </a:xfrm>
           <a:prstGeom prst="rect">
             <a:avLst/>
@@ -1100,8 +1102,8 @@
         </p:blipFill>
         <p:spPr>
           <a:xfrm>
-            <a:off x="385762" y="333374"/>
-            <a:ext cx="1628775" cy="750257"/>
+            <a:off x="514350" y="333375"/>
+            <a:ext cx="2171700" cy="750257"/>
           </a:xfrm>
           <a:prstGeom prst="rect">
             <a:avLst/>
@@ -1139,8 +1141,8 @@
         </p:blipFill>
         <p:spPr>
           <a:xfrm>
-            <a:off x="7668344" y="345600"/>
-            <a:ext cx="1124442" cy="565460"/>
+            <a:off x="10224459" y="345600"/>
+            <a:ext cx="1499256" cy="565460"/>
           </a:xfrm>
           <a:prstGeom prst="rect">
             <a:avLst/>
@@ -1189,8 +1191,8 @@
         </p:nvSpPr>
         <p:spPr>
           <a:xfrm>
-            <a:off x="400050" y="1201567"/>
-            <a:ext cx="8343900" cy="4904510"/>
+            <a:off x="533400" y="1201567"/>
+            <a:ext cx="11125200" cy="4904510"/>
           </a:xfrm>
         </p:spPr>
         <p:txBody>
@@ -1297,8 +1299,8 @@
         </p:nvSpPr>
         <p:spPr>
           <a:xfrm>
-            <a:off x="400050" y="394871"/>
-            <a:ext cx="6865128" cy="496888"/>
+            <a:off x="533400" y="394871"/>
+            <a:ext cx="9153504" cy="496888"/>
           </a:xfrm>
           <a:prstGeom prst="rect">
             <a:avLst/>
@@ -1360,8 +1362,8 @@
         </p:nvSpPr>
         <p:spPr>
           <a:xfrm>
-            <a:off x="6770386" y="365125"/>
-            <a:ext cx="1971675" cy="5811838"/>
+            <a:off x="9027182" y="365125"/>
+            <a:ext cx="2628900" cy="5811838"/>
           </a:xfrm>
           <a:prstGeom prst="rect">
             <a:avLst/>
@@ -1395,8 +1397,8 @@
         </p:nvSpPr>
         <p:spPr>
           <a:xfrm>
-            <a:off x="401940" y="365125"/>
-            <a:ext cx="6225572" cy="5811838"/>
+            <a:off x="535920" y="365125"/>
+            <a:ext cx="8300763" cy="5811838"/>
           </a:xfrm>
         </p:spPr>
         <p:txBody>
@@ -1527,8 +1529,8 @@
         </p:nvSpPr>
         <p:spPr>
           <a:xfrm>
-            <a:off x="400050" y="1201567"/>
-            <a:ext cx="8343900" cy="4904510"/>
+            <a:off x="533400" y="1201567"/>
+            <a:ext cx="11125200" cy="4904510"/>
           </a:xfrm>
         </p:spPr>
         <p:txBody>
@@ -1641,8 +1643,8 @@
         </p:nvSpPr>
         <p:spPr>
           <a:xfrm>
-            <a:off x="400050" y="394871"/>
-            <a:ext cx="6865128" cy="496888"/>
+            <a:off x="533400" y="394871"/>
+            <a:ext cx="9153504" cy="496888"/>
           </a:xfrm>
           <a:prstGeom prst="rect">
             <a:avLst/>
@@ -1676,7 +1678,7 @@
         </p:nvSpPr>
         <p:spPr>
           <a:xfrm>
-            <a:off x="2156791" y="6490252"/>
+            <a:off x="2875722" y="6490252"/>
             <a:ext cx="184731" cy="369332"/>
           </a:xfrm>
           <a:prstGeom prst="rect">
@@ -1690,7 +1692,7 @@
           </a:bodyPr>
           <a:lstStyle/>
           <a:p>
-            <a:endParaRPr lang="en-US" dirty="0"/>
+            <a:endParaRPr lang="en-US" sz="1800" dirty="0"/>
           </a:p>
         </p:txBody>
       </p:sp>
@@ -1787,8 +1789,8 @@
         </p:nvSpPr>
         <p:spPr>
           <a:xfrm>
-            <a:off x="722313" y="4406900"/>
-            <a:ext cx="7772400" cy="1362075"/>
+            <a:off x="963084" y="4406901"/>
+            <a:ext cx="10363200" cy="1362075"/>
           </a:xfrm>
         </p:spPr>
         <p:txBody>
@@ -1825,8 +1827,8 @@
         </p:nvSpPr>
         <p:spPr>
           <a:xfrm>
-            <a:off x="722313" y="2906713"/>
-            <a:ext cx="7772400" cy="1500187"/>
+            <a:off x="963084" y="2906713"/>
+            <a:ext cx="10363200" cy="1500187"/>
           </a:xfrm>
         </p:spPr>
         <p:txBody>
@@ -1920,8 +1922,8 @@
         </p:nvSpPr>
         <p:spPr>
           <a:xfrm>
-            <a:off x="400050" y="1201567"/>
-            <a:ext cx="4114800" cy="4975396"/>
+            <a:off x="533400" y="1201567"/>
+            <a:ext cx="5486400" cy="4975396"/>
           </a:xfrm>
         </p:spPr>
         <p:txBody>
@@ -1977,8 +1979,8 @@
         </p:nvSpPr>
         <p:spPr>
           <a:xfrm>
-            <a:off x="4629149" y="1201567"/>
-            <a:ext cx="4114799" cy="4975396"/>
+            <a:off x="6172199" y="1201567"/>
+            <a:ext cx="5486399" cy="4975396"/>
           </a:xfrm>
         </p:spPr>
         <p:txBody>
@@ -2085,8 +2087,8 @@
         </p:nvSpPr>
         <p:spPr>
           <a:xfrm>
-            <a:off x="400050" y="394871"/>
-            <a:ext cx="6865128" cy="496888"/>
+            <a:off x="533400" y="394871"/>
+            <a:ext cx="9153504" cy="496888"/>
           </a:xfrm>
           <a:prstGeom prst="rect">
             <a:avLst/>
@@ -2148,8 +2150,8 @@
         </p:nvSpPr>
         <p:spPr>
           <a:xfrm>
-            <a:off x="400050" y="1203334"/>
-            <a:ext cx="4098132" cy="823912"/>
+            <a:off x="533400" y="1203334"/>
+            <a:ext cx="5464176" cy="823912"/>
           </a:xfrm>
         </p:spPr>
         <p:txBody>
@@ -2215,8 +2217,8 @@
         </p:nvSpPr>
         <p:spPr>
           <a:xfrm>
-            <a:off x="400050" y="2214208"/>
-            <a:ext cx="4098132" cy="3975455"/>
+            <a:off x="533400" y="2214209"/>
+            <a:ext cx="5464176" cy="3975455"/>
           </a:xfrm>
         </p:spPr>
         <p:txBody>
@@ -2272,8 +2274,8 @@
         </p:nvSpPr>
         <p:spPr>
           <a:xfrm>
-            <a:off x="4645818" y="1203334"/>
-            <a:ext cx="4098132" cy="823912"/>
+            <a:off x="6194424" y="1203334"/>
+            <a:ext cx="5464176" cy="823912"/>
           </a:xfrm>
         </p:spPr>
         <p:txBody>
@@ -2339,8 +2341,8 @@
         </p:nvSpPr>
         <p:spPr>
           <a:xfrm>
-            <a:off x="4645818" y="2214208"/>
-            <a:ext cx="4098132" cy="3975455"/>
+            <a:off x="6194424" y="2214209"/>
+            <a:ext cx="5464176" cy="3975455"/>
           </a:xfrm>
         </p:spPr>
         <p:txBody>
@@ -2447,8 +2449,8 @@
         </p:nvSpPr>
         <p:spPr>
           <a:xfrm>
-            <a:off x="400050" y="394871"/>
-            <a:ext cx="6865128" cy="496888"/>
+            <a:off x="533400" y="394871"/>
+            <a:ext cx="9153504" cy="496888"/>
           </a:xfrm>
           <a:prstGeom prst="rect">
             <a:avLst/>
@@ -2561,8 +2563,8 @@
         </p:nvSpPr>
         <p:spPr>
           <a:xfrm>
-            <a:off x="400050" y="394871"/>
-            <a:ext cx="6865128" cy="496888"/>
+            <a:off x="533400" y="394871"/>
+            <a:ext cx="9153504" cy="496888"/>
           </a:xfrm>
           <a:prstGeom prst="rect">
             <a:avLst/>
@@ -2699,8 +2701,8 @@
         </p:nvSpPr>
         <p:spPr>
           <a:xfrm>
-            <a:off x="3861640" y="1125998"/>
-            <a:ext cx="4882310" cy="4735054"/>
+            <a:off x="5148853" y="1125998"/>
+            <a:ext cx="6509747" cy="4735054"/>
           </a:xfrm>
         </p:spPr>
         <p:txBody>
@@ -2784,8 +2786,8 @@
         </p:nvSpPr>
         <p:spPr>
           <a:xfrm>
-            <a:off x="400050" y="1125248"/>
-            <a:ext cx="3178969" cy="4743740"/>
+            <a:off x="533401" y="1125248"/>
+            <a:ext cx="4238625" cy="4743740"/>
           </a:xfrm>
         </p:spPr>
         <p:txBody>
@@ -2900,8 +2902,8 @@
         </p:nvSpPr>
         <p:spPr>
           <a:xfrm>
-            <a:off x="400050" y="394871"/>
-            <a:ext cx="6865128" cy="496888"/>
+            <a:off x="533400" y="394871"/>
+            <a:ext cx="9153504" cy="496888"/>
           </a:xfrm>
           <a:prstGeom prst="rect">
             <a:avLst/>
@@ -2963,8 +2965,8 @@
         </p:nvSpPr>
         <p:spPr>
           <a:xfrm>
-            <a:off x="1843914" y="624690"/>
-            <a:ext cx="5471285" cy="4149200"/>
+            <a:off x="2458553" y="624690"/>
+            <a:ext cx="7295047" cy="4149200"/>
           </a:xfrm>
         </p:spPr>
         <p:txBody>
@@ -3079,8 +3081,8 @@
         </p:nvSpPr>
         <p:spPr>
           <a:xfrm>
-            <a:off x="1843913" y="4836495"/>
-            <a:ext cx="5468677" cy="566777"/>
+            <a:off x="2458552" y="4836496"/>
+            <a:ext cx="7291569" cy="566777"/>
           </a:xfrm>
           <a:prstGeom prst="rect">
             <a:avLst/>
@@ -3122,8 +3124,8 @@
         </p:nvSpPr>
         <p:spPr>
           <a:xfrm>
-            <a:off x="1846521" y="5463728"/>
-            <a:ext cx="5468677" cy="769581"/>
+            <a:off x="2462029" y="5463729"/>
+            <a:ext cx="7291569" cy="769581"/>
           </a:xfrm>
         </p:spPr>
         <p:txBody>
@@ -3242,7 +3244,7 @@
         <p:spPr bwMode="auto">
           <a:xfrm>
             <a:off x="0" y="0"/>
-            <a:ext cx="9144000" cy="6858000"/>
+            <a:ext cx="12192000" cy="6858000"/>
           </a:xfrm>
           <a:prstGeom prst="rect">
             <a:avLst/>
@@ -3284,8 +3286,8 @@
         </p:nvSpPr>
         <p:spPr>
           <a:xfrm>
-            <a:off x="400050" y="394871"/>
-            <a:ext cx="6865128" cy="496888"/>
+            <a:off x="533400" y="394871"/>
+            <a:ext cx="9153504" cy="496888"/>
           </a:xfrm>
           <a:prstGeom prst="rect">
             <a:avLst/>
@@ -3317,8 +3319,8 @@
         </p:nvSpPr>
         <p:spPr>
           <a:xfrm>
-            <a:off x="400050" y="1210021"/>
-            <a:ext cx="8343900" cy="4896056"/>
+            <a:off x="533400" y="1210021"/>
+            <a:ext cx="11125200" cy="4896056"/>
           </a:xfrm>
           <a:prstGeom prst="rect">
             <a:avLst/>
@@ -3379,8 +3381,8 @@
         </p:nvSpPr>
         <p:spPr>
           <a:xfrm>
-            <a:off x="627233" y="6445473"/>
-            <a:ext cx="1027755" cy="365125"/>
+            <a:off x="836311" y="6445474"/>
+            <a:ext cx="1370340" cy="365125"/>
           </a:xfrm>
           <a:prstGeom prst="rect">
             <a:avLst/>
@@ -3418,8 +3420,8 @@
         </p:nvSpPr>
         <p:spPr>
           <a:xfrm>
-            <a:off x="255523" y="6445473"/>
-            <a:ext cx="326368" cy="296863"/>
+            <a:off x="340698" y="6445474"/>
+            <a:ext cx="435157" cy="296863"/>
           </a:xfrm>
           <a:prstGeom prst="rect">
             <a:avLst/>
@@ -3474,8 +3476,8 @@
         </p:blipFill>
         <p:spPr>
           <a:xfrm>
-            <a:off x="7665228" y="333375"/>
-            <a:ext cx="1078722" cy="496888"/>
+            <a:off x="10220304" y="333375"/>
+            <a:ext cx="1438296" cy="496888"/>
           </a:xfrm>
           <a:prstGeom prst="rect">
             <a:avLst/>
@@ -3498,8 +3500,8 @@
         </p:nvSpPr>
         <p:spPr>
           <a:xfrm>
-            <a:off x="5934974" y="6445473"/>
-            <a:ext cx="2808976" cy="365125"/>
+            <a:off x="7913299" y="6445474"/>
+            <a:ext cx="3745301" cy="365125"/>
           </a:xfrm>
           <a:prstGeom prst="rect">
             <a:avLst/>
@@ -3640,8 +3642,8 @@
         </p:nvSpPr>
         <p:spPr>
           <a:xfrm>
-            <a:off x="1700330" y="6445473"/>
-            <a:ext cx="4234644" cy="365125"/>
+            <a:off x="2267107" y="6445474"/>
+            <a:ext cx="5646192" cy="365125"/>
           </a:xfrm>
           <a:prstGeom prst="rect">
             <a:avLst/>
@@ -3746,7 +3748,7 @@
           </a:lstStyle>
           <a:p>
             <a:r>
-              <a:rPr lang="de-DE" dirty="0"/>
+              <a:rPr lang="de-DE" sz="900" dirty="0"/>
               <a:t>Simon Schwarz - Editor für Datenflussdiagramme</a:t>
             </a:r>
           </a:p>
@@ -4077,7 +4079,7 @@
             <a:srgbClr val="F26B43"/>
           </p15:clr>
         </p15:guide>
-        <p15:guide id="2" pos="2880" userDrawn="1">
+        <p15:guide id="2" pos="3840" userDrawn="1">
           <p15:clr>
             <a:srgbClr val="F26B43"/>
           </p15:clr>
@@ -4121,7 +4123,7 @@
         </p:nvSpPr>
         <p:spPr bwMode="auto">
           <a:xfrm>
-            <a:off x="395288" y="1412875"/>
+            <a:off x="1919289" y="1412876"/>
             <a:ext cx="8389937" cy="720725"/>
           </a:xfrm>
           <a:prstGeom prst="rect">
@@ -4284,7 +4286,7 @@
         </p:nvSpPr>
         <p:spPr bwMode="auto">
           <a:xfrm>
-            <a:off x="396875" y="2349500"/>
+            <a:off x="1920875" y="2349501"/>
             <a:ext cx="8370888" cy="620713"/>
           </a:xfrm>
           <a:prstGeom prst="rect">
@@ -4472,6 +4474,39 @@
               </a:rPr>
               <a:t>Praktikum Ingenieursmäßige Softwareentwicklung</a:t>
             </a:r>
+          </a:p>
+          <a:p>
+            <a:pPr>
+              <a:lnSpc>
+                <a:spcPct val="150000"/>
+              </a:lnSpc>
+              <a:spcBef>
+                <a:spcPct val="0"/>
+              </a:spcBef>
+              <a:buFontTx/>
+              <a:buNone/>
+            </a:pPr>
+            <a:r>
+              <a:rPr lang="de-DE" altLang="de-DE" sz="1400" b="1" dirty="0">
+                <a:solidFill>
+                  <a:srgbClr val="000000"/>
+                </a:solidFill>
+              </a:rPr>
+              <a:t>Betreuer: Stephan </a:t>
+            </a:r>
+            <a:r>
+              <a:rPr lang="de-DE" altLang="de-DE" sz="1400" b="1" dirty="0" err="1">
+                <a:solidFill>
+                  <a:srgbClr val="000000"/>
+                </a:solidFill>
+              </a:rPr>
+              <a:t>Seifermann</a:t>
+            </a:r>
+            <a:endParaRPr lang="de-DE" altLang="de-DE" sz="1400" b="1" dirty="0">
+              <a:solidFill>
+                <a:srgbClr val="000000"/>
+              </a:solidFill>
+            </a:endParaRPr>
           </a:p>
         </p:txBody>
       </p:sp>
@@ -4523,7 +4558,7 @@
         </p:nvSpPr>
         <p:spPr>
           <a:xfrm>
-            <a:off x="400050" y="1201567"/>
+            <a:off x="1924050" y="1201568"/>
             <a:ext cx="8343900" cy="4694601"/>
           </a:xfrm>
         </p:spPr>
@@ -4538,29 +4573,7 @@
             </a:pPr>
             <a:r>
               <a:rPr lang="de-DE" dirty="0"/>
-              <a:t>Datenorientierte Darstellung von Systemen</a:t>
-            </a:r>
-          </a:p>
-          <a:p>
-            <a:pPr>
-              <a:lnSpc>
-                <a:spcPct val="100000"/>
-              </a:lnSpc>
-            </a:pPr>
-            <a:r>
-              <a:rPr lang="de-DE" dirty="0"/>
-              <a:t>4 Einheiten</a:t>
-            </a:r>
-          </a:p>
-          <a:p>
-            <a:pPr>
-              <a:lnSpc>
-                <a:spcPct val="100000"/>
-              </a:lnSpc>
-            </a:pPr>
-            <a:r>
-              <a:rPr lang="de-DE" dirty="0"/>
-              <a:t>Verfeinern in Subdiagramme möglich</a:t>
+              <a:t>DFD ...</a:t>
             </a:r>
           </a:p>
         </p:txBody>
@@ -4588,7 +4601,7 @@
           <a:p>
             <a:r>
               <a:rPr lang="de-DE" dirty="0"/>
-              <a:t>Datenflussdiagramm</a:t>
+              <a:t>Motivation</a:t>
             </a:r>
           </a:p>
         </p:txBody>
@@ -4683,7 +4696,7 @@
         </p:blipFill>
         <p:spPr>
           <a:xfrm>
-            <a:off x="3865798" y="3381224"/>
+            <a:off x="5389798" y="3381224"/>
             <a:ext cx="1435100" cy="1435100"/>
           </a:xfrm>
           <a:prstGeom prst="rect">
@@ -4722,7 +4735,7 @@
         </p:blipFill>
         <p:spPr>
           <a:xfrm>
-            <a:off x="6899254" y="3673619"/>
+            <a:off x="8423254" y="3673619"/>
             <a:ext cx="1943100" cy="800100"/>
           </a:xfrm>
           <a:prstGeom prst="rect">
@@ -4761,7 +4774,7 @@
         </p:blipFill>
         <p:spPr>
           <a:xfrm>
-            <a:off x="315288" y="3673619"/>
+            <a:off x="1839288" y="3673619"/>
             <a:ext cx="1943100" cy="800100"/>
           </a:xfrm>
           <a:prstGeom prst="rect">
@@ -4786,7 +4799,7 @@
         </p:nvCxnSpPr>
         <p:spPr>
           <a:xfrm>
-            <a:off x="2267442" y="4091306"/>
+            <a:off x="3791442" y="4091306"/>
             <a:ext cx="1598356" cy="7468"/>
           </a:xfrm>
           <a:prstGeom prst="straightConnector1">
@@ -4829,7 +4842,7 @@
         </p:nvSpPr>
         <p:spPr>
           <a:xfrm>
-            <a:off x="464716" y="3886490"/>
+            <a:off x="1988717" y="3886490"/>
             <a:ext cx="1646669" cy="369332"/>
           </a:xfrm>
           <a:prstGeom prst="rect">
@@ -4874,7 +4887,7 @@
         </p:nvSpPr>
         <p:spPr>
           <a:xfrm>
-            <a:off x="4102650" y="3886490"/>
+            <a:off x="5626651" y="3886490"/>
             <a:ext cx="1018227" cy="369332"/>
           </a:xfrm>
           <a:prstGeom prst="rect">
@@ -4910,7 +4923,7 @@
         </p:nvSpPr>
         <p:spPr>
           <a:xfrm>
-            <a:off x="7502754" y="3897122"/>
+            <a:off x="9026755" y="3897122"/>
             <a:ext cx="736099" cy="369332"/>
           </a:xfrm>
           <a:prstGeom prst="rect">
@@ -4945,7 +4958,7 @@
         </p:nvSpPr>
         <p:spPr>
           <a:xfrm>
-            <a:off x="2431351" y="3652767"/>
+            <a:off x="3955351" y="3652767"/>
             <a:ext cx="1274708" cy="369332"/>
           </a:xfrm>
           <a:prstGeom prst="rect">
@@ -4981,7 +4994,7 @@
         </p:nvSpPr>
         <p:spPr>
           <a:xfrm>
-            <a:off x="5393597" y="4146437"/>
+            <a:off x="6917597" y="4146437"/>
             <a:ext cx="1274708" cy="369332"/>
           </a:xfrm>
           <a:prstGeom prst="rect">
@@ -5019,7 +5032,7 @@
         </p:nvCxnSpPr>
         <p:spPr>
           <a:xfrm>
-            <a:off x="5300898" y="4095040"/>
+            <a:off x="6824898" y="4095040"/>
             <a:ext cx="1598356" cy="7468"/>
           </a:xfrm>
           <a:prstGeom prst="straightConnector1">
@@ -5096,7 +5109,7 @@
         </p:nvSpPr>
         <p:spPr>
           <a:xfrm>
-            <a:off x="400050" y="1201567"/>
+            <a:off x="1924050" y="1201568"/>
             <a:ext cx="8343900" cy="4694601"/>
           </a:xfrm>
         </p:spPr>
@@ -5111,7 +5124,7 @@
             </a:pPr>
             <a:r>
               <a:rPr lang="de-DE" dirty="0"/>
-              <a:t>Definition von allen möglichen Datentypen</a:t>
+              <a:t>Datenorientierte Darstellung von Systemen</a:t>
             </a:r>
           </a:p>
           <a:p>
@@ -5122,7 +5135,7 @@
             </a:pPr>
             <a:r>
               <a:rPr lang="de-DE" dirty="0"/>
-              <a:t>3 Einheiten</a:t>
+              <a:t>4 Einheiten</a:t>
             </a:r>
           </a:p>
           <a:p>
@@ -5133,29 +5146,7 @@
             </a:pPr>
             <a:r>
               <a:rPr lang="de-DE" dirty="0"/>
-              <a:t>Grundlage für</a:t>
-            </a:r>
-          </a:p>
-          <a:p>
-            <a:pPr lvl="1">
-              <a:lnSpc>
-                <a:spcPct val="100000"/>
-              </a:lnSpc>
-            </a:pPr>
-            <a:r>
-              <a:rPr lang="de-DE" dirty="0"/>
-              <a:t>Verfeinern</a:t>
-            </a:r>
-          </a:p>
-          <a:p>
-            <a:pPr lvl="1">
-              <a:lnSpc>
-                <a:spcPct val="100000"/>
-              </a:lnSpc>
-            </a:pPr>
-            <a:r>
-              <a:rPr lang="de-DE" dirty="0"/>
-              <a:t>Konsistenzbedingungen</a:t>
+              <a:t>Verfeinern in Subdiagramme möglich</a:t>
             </a:r>
           </a:p>
         </p:txBody>
@@ -5183,13 +5174,8 @@
           <a:p>
             <a:r>
               <a:rPr lang="de-DE" dirty="0"/>
-              <a:t>Data </a:t>
-            </a:r>
-            <a:r>
-              <a:rPr lang="de-DE" dirty="0" err="1"/>
-              <a:t>Dictionary</a:t>
-            </a:r>
-            <a:endParaRPr lang="de-DE" dirty="0"/>
+              <a:t>Datenflussdiagramm</a:t>
+            </a:r>
           </a:p>
         </p:txBody>
       </p:sp>
@@ -5252,6 +5238,606 @@
           </a:p>
         </p:txBody>
       </p:sp>
+      <p:pic>
+        <p:nvPicPr>
+          <p:cNvPr id="7" name="Grafik 6">
+            <a:extLst>
+              <a:ext uri="{FF2B5EF4-FFF2-40B4-BE49-F238E27FC236}">
+                <a16:creationId xmlns:a16="http://schemas.microsoft.com/office/drawing/2014/main" id="{E704304B-68FA-0C41-8F0E-37A221BB0D49}"/>
+              </a:ext>
+            </a:extLst>
+          </p:cNvPr>
+          <p:cNvPicPr>
+            <a:picLocks noChangeAspect="1"/>
+          </p:cNvPicPr>
+          <p:nvPr/>
+        </p:nvPicPr>
+        <p:blipFill>
+          <a:blip r:embed="rId2">
+            <a:extLst>
+              <a:ext uri="{28A0092B-C50C-407E-A947-70E740481C1C}">
+                <a14:useLocalDpi xmlns:a14="http://schemas.microsoft.com/office/drawing/2010/main" val="0"/>
+              </a:ext>
+              <a:ext uri="{96DAC541-7B7A-43D3-8B79-37D633B846F1}">
+                <asvg:svgBlip xmlns:asvg="http://schemas.microsoft.com/office/drawing/2016/SVG/main" r:embed="rId3"/>
+              </a:ext>
+            </a:extLst>
+          </a:blip>
+          <a:stretch>
+            <a:fillRect/>
+          </a:stretch>
+        </p:blipFill>
+        <p:spPr>
+          <a:xfrm>
+            <a:off x="5389798" y="3381224"/>
+            <a:ext cx="1435100" cy="1435100"/>
+          </a:xfrm>
+          <a:prstGeom prst="rect">
+            <a:avLst/>
+          </a:prstGeom>
+        </p:spPr>
+      </p:pic>
+      <p:pic>
+        <p:nvPicPr>
+          <p:cNvPr id="22" name="Grafik 21">
+            <a:extLst>
+              <a:ext uri="{FF2B5EF4-FFF2-40B4-BE49-F238E27FC236}">
+                <a16:creationId xmlns:a16="http://schemas.microsoft.com/office/drawing/2014/main" id="{4FA0C72E-9642-4442-90DC-E38862AE6F34}"/>
+              </a:ext>
+            </a:extLst>
+          </p:cNvPr>
+          <p:cNvPicPr>
+            <a:picLocks noChangeAspect="1"/>
+          </p:cNvPicPr>
+          <p:nvPr/>
+        </p:nvPicPr>
+        <p:blipFill>
+          <a:blip r:embed="rId4">
+            <a:extLst>
+              <a:ext uri="{28A0092B-C50C-407E-A947-70E740481C1C}">
+                <a14:useLocalDpi xmlns:a14="http://schemas.microsoft.com/office/drawing/2010/main" val="0"/>
+              </a:ext>
+              <a:ext uri="{96DAC541-7B7A-43D3-8B79-37D633B846F1}">
+                <asvg:svgBlip xmlns:asvg="http://schemas.microsoft.com/office/drawing/2016/SVG/main" r:embed="rId5"/>
+              </a:ext>
+            </a:extLst>
+          </a:blip>
+          <a:stretch>
+            <a:fillRect/>
+          </a:stretch>
+        </p:blipFill>
+        <p:spPr>
+          <a:xfrm>
+            <a:off x="8423254" y="3673619"/>
+            <a:ext cx="1943100" cy="800100"/>
+          </a:xfrm>
+          <a:prstGeom prst="rect">
+            <a:avLst/>
+          </a:prstGeom>
+        </p:spPr>
+      </p:pic>
+      <p:pic>
+        <p:nvPicPr>
+          <p:cNvPr id="24" name="Grafik 23">
+            <a:extLst>
+              <a:ext uri="{FF2B5EF4-FFF2-40B4-BE49-F238E27FC236}">
+                <a16:creationId xmlns:a16="http://schemas.microsoft.com/office/drawing/2014/main" id="{07D4935C-9E5F-CB43-9333-E06666C267FD}"/>
+              </a:ext>
+            </a:extLst>
+          </p:cNvPr>
+          <p:cNvPicPr>
+            <a:picLocks noChangeAspect="1"/>
+          </p:cNvPicPr>
+          <p:nvPr/>
+        </p:nvPicPr>
+        <p:blipFill>
+          <a:blip r:embed="rId6">
+            <a:extLst>
+              <a:ext uri="{28A0092B-C50C-407E-A947-70E740481C1C}">
+                <a14:useLocalDpi xmlns:a14="http://schemas.microsoft.com/office/drawing/2010/main" val="0"/>
+              </a:ext>
+              <a:ext uri="{96DAC541-7B7A-43D3-8B79-37D633B846F1}">
+                <asvg:svgBlip xmlns:asvg="http://schemas.microsoft.com/office/drawing/2016/SVG/main" r:embed="rId7"/>
+              </a:ext>
+            </a:extLst>
+          </a:blip>
+          <a:stretch>
+            <a:fillRect/>
+          </a:stretch>
+        </p:blipFill>
+        <p:spPr>
+          <a:xfrm>
+            <a:off x="1839288" y="3673619"/>
+            <a:ext cx="1943100" cy="800100"/>
+          </a:xfrm>
+          <a:prstGeom prst="rect">
+            <a:avLst/>
+          </a:prstGeom>
+        </p:spPr>
+      </p:pic>
+      <p:cxnSp>
+        <p:nvCxnSpPr>
+          <p:cNvPr id="26" name="Gerade Verbindung mit Pfeil 25">
+            <a:extLst>
+              <a:ext uri="{FF2B5EF4-FFF2-40B4-BE49-F238E27FC236}">
+                <a16:creationId xmlns:a16="http://schemas.microsoft.com/office/drawing/2014/main" id="{E359F44F-645D-3141-BC63-2EDF456D0035}"/>
+              </a:ext>
+            </a:extLst>
+          </p:cNvPr>
+          <p:cNvCxnSpPr>
+            <a:cxnSpLocks/>
+            <a:endCxn id="7" idx="1"/>
+          </p:cNvCxnSpPr>
+          <p:nvPr/>
+        </p:nvCxnSpPr>
+        <p:spPr>
+          <a:xfrm>
+            <a:off x="3791442" y="4091306"/>
+            <a:ext cx="1598356" cy="7468"/>
+          </a:xfrm>
+          <a:prstGeom prst="straightConnector1">
+            <a:avLst/>
+          </a:prstGeom>
+          <a:ln w="38100">
+            <a:solidFill>
+              <a:schemeClr val="tx1"/>
+            </a:solidFill>
+            <a:headEnd w="lg" len="med"/>
+            <a:tailEnd type="triangle" w="lg" len="med"/>
+          </a:ln>
+        </p:spPr>
+        <p:style>
+          <a:lnRef idx="1">
+            <a:schemeClr val="accent1"/>
+          </a:lnRef>
+          <a:fillRef idx="0">
+            <a:schemeClr val="accent1"/>
+          </a:fillRef>
+          <a:effectRef idx="0">
+            <a:schemeClr val="accent1"/>
+          </a:effectRef>
+          <a:fontRef idx="minor">
+            <a:schemeClr val="tx1"/>
+          </a:fontRef>
+        </p:style>
+      </p:cxnSp>
+      <p:sp>
+        <p:nvSpPr>
+          <p:cNvPr id="36" name="Textfeld 35">
+            <a:extLst>
+              <a:ext uri="{FF2B5EF4-FFF2-40B4-BE49-F238E27FC236}">
+                <a16:creationId xmlns:a16="http://schemas.microsoft.com/office/drawing/2014/main" id="{B256EAD0-A912-2D40-BB1A-A7F3FACE49A5}"/>
+              </a:ext>
+            </a:extLst>
+          </p:cNvPr>
+          <p:cNvSpPr txBox="1"/>
+          <p:nvPr/>
+        </p:nvSpPr>
+        <p:spPr>
+          <a:xfrm>
+            <a:off x="1988717" y="3886490"/>
+            <a:ext cx="1646669" cy="369332"/>
+          </a:xfrm>
+          <a:prstGeom prst="rect">
+            <a:avLst/>
+          </a:prstGeom>
+          <a:noFill/>
+        </p:spPr>
+        <p:txBody>
+          <a:bodyPr wrap="none" rtlCol="0">
+            <a:spAutoFit/>
+          </a:bodyPr>
+          <a:lstStyle/>
+          <a:p>
+            <a:pPr algn="ctr"/>
+            <a:r>
+              <a:rPr lang="en-US" dirty="0" err="1"/>
+              <a:t>Externer</a:t>
+            </a:r>
+            <a:r>
+              <a:rPr lang="en-US" dirty="0"/>
+              <a:t> </a:t>
+            </a:r>
+            <a:r>
+              <a:rPr lang="en-US" dirty="0" err="1"/>
+              <a:t>Aktor</a:t>
+            </a:r>
+            <a:endParaRPr lang="en-US" dirty="0"/>
+          </a:p>
+        </p:txBody>
+      </p:sp>
+      <p:sp>
+        <p:nvSpPr>
+          <p:cNvPr id="37" name="Textfeld 36">
+            <a:extLst>
+              <a:ext uri="{FF2B5EF4-FFF2-40B4-BE49-F238E27FC236}">
+                <a16:creationId xmlns:a16="http://schemas.microsoft.com/office/drawing/2014/main" id="{7528BD6A-7E3F-8D4D-B1A2-0EFDC1E760B7}"/>
+              </a:ext>
+            </a:extLst>
+          </p:cNvPr>
+          <p:cNvSpPr txBox="1"/>
+          <p:nvPr/>
+        </p:nvSpPr>
+        <p:spPr>
+          <a:xfrm>
+            <a:off x="5626651" y="3886490"/>
+            <a:ext cx="1018227" cy="369332"/>
+          </a:xfrm>
+          <a:prstGeom prst="rect">
+            <a:avLst/>
+          </a:prstGeom>
+          <a:noFill/>
+        </p:spPr>
+        <p:txBody>
+          <a:bodyPr wrap="none" rtlCol="0">
+            <a:spAutoFit/>
+          </a:bodyPr>
+          <a:lstStyle/>
+          <a:p>
+            <a:r>
+              <a:rPr lang="en-US" dirty="0" err="1"/>
+              <a:t>Prozess</a:t>
+            </a:r>
+            <a:endParaRPr lang="en-US" dirty="0"/>
+          </a:p>
+        </p:txBody>
+      </p:sp>
+      <p:sp>
+        <p:nvSpPr>
+          <p:cNvPr id="38" name="Textfeld 37">
+            <a:extLst>
+              <a:ext uri="{FF2B5EF4-FFF2-40B4-BE49-F238E27FC236}">
+                <a16:creationId xmlns:a16="http://schemas.microsoft.com/office/drawing/2014/main" id="{874D86E9-2A5D-7844-BA07-B5C770642098}"/>
+              </a:ext>
+            </a:extLst>
+          </p:cNvPr>
+          <p:cNvSpPr txBox="1"/>
+          <p:nvPr/>
+        </p:nvSpPr>
+        <p:spPr>
+          <a:xfrm>
+            <a:off x="9026755" y="3897122"/>
+            <a:ext cx="736099" cy="369332"/>
+          </a:xfrm>
+          <a:prstGeom prst="rect">
+            <a:avLst/>
+          </a:prstGeom>
+          <a:noFill/>
+        </p:spPr>
+        <p:txBody>
+          <a:bodyPr wrap="none" rtlCol="0">
+            <a:spAutoFit/>
+          </a:bodyPr>
+          <a:lstStyle/>
+          <a:p>
+            <a:r>
+              <a:rPr lang="en-US" dirty="0"/>
+              <a:t>Store</a:t>
+            </a:r>
+          </a:p>
+        </p:txBody>
+      </p:sp>
+      <p:sp>
+        <p:nvSpPr>
+          <p:cNvPr id="39" name="Textfeld 38">
+            <a:extLst>
+              <a:ext uri="{FF2B5EF4-FFF2-40B4-BE49-F238E27FC236}">
+                <a16:creationId xmlns:a16="http://schemas.microsoft.com/office/drawing/2014/main" id="{3317288B-23DD-854B-A922-8B661178A6E7}"/>
+              </a:ext>
+            </a:extLst>
+          </p:cNvPr>
+          <p:cNvSpPr txBox="1"/>
+          <p:nvPr/>
+        </p:nvSpPr>
+        <p:spPr>
+          <a:xfrm>
+            <a:off x="3955351" y="3652767"/>
+            <a:ext cx="1274708" cy="369332"/>
+          </a:xfrm>
+          <a:prstGeom prst="rect">
+            <a:avLst/>
+          </a:prstGeom>
+          <a:noFill/>
+        </p:spPr>
+        <p:txBody>
+          <a:bodyPr wrap="none" rtlCol="0">
+            <a:spAutoFit/>
+          </a:bodyPr>
+          <a:lstStyle/>
+          <a:p>
+            <a:r>
+              <a:rPr lang="en-US" dirty="0" err="1"/>
+              <a:t>Datenfluss</a:t>
+            </a:r>
+            <a:endParaRPr lang="en-US" dirty="0"/>
+          </a:p>
+        </p:txBody>
+      </p:sp>
+      <p:sp>
+        <p:nvSpPr>
+          <p:cNvPr id="40" name="Textfeld 39">
+            <a:extLst>
+              <a:ext uri="{FF2B5EF4-FFF2-40B4-BE49-F238E27FC236}">
+                <a16:creationId xmlns:a16="http://schemas.microsoft.com/office/drawing/2014/main" id="{38BEA964-1E3B-D642-A99C-D9E512C0CA57}"/>
+              </a:ext>
+            </a:extLst>
+          </p:cNvPr>
+          <p:cNvSpPr txBox="1"/>
+          <p:nvPr/>
+        </p:nvSpPr>
+        <p:spPr>
+          <a:xfrm>
+            <a:off x="6917597" y="4146437"/>
+            <a:ext cx="1274708" cy="369332"/>
+          </a:xfrm>
+          <a:prstGeom prst="rect">
+            <a:avLst/>
+          </a:prstGeom>
+          <a:noFill/>
+        </p:spPr>
+        <p:txBody>
+          <a:bodyPr wrap="none" rtlCol="0">
+            <a:spAutoFit/>
+          </a:bodyPr>
+          <a:lstStyle/>
+          <a:p>
+            <a:r>
+              <a:rPr lang="en-US" dirty="0" err="1"/>
+              <a:t>Datenfluss</a:t>
+            </a:r>
+            <a:endParaRPr lang="en-US" dirty="0"/>
+          </a:p>
+        </p:txBody>
+      </p:sp>
+      <p:cxnSp>
+        <p:nvCxnSpPr>
+          <p:cNvPr id="45" name="Gerade Verbindung mit Pfeil 44">
+            <a:extLst>
+              <a:ext uri="{FF2B5EF4-FFF2-40B4-BE49-F238E27FC236}">
+                <a16:creationId xmlns:a16="http://schemas.microsoft.com/office/drawing/2014/main" id="{B1B62239-E92C-444A-BFC7-A1B0AB8D83BE}"/>
+              </a:ext>
+            </a:extLst>
+          </p:cNvPr>
+          <p:cNvCxnSpPr>
+            <a:cxnSpLocks/>
+          </p:cNvCxnSpPr>
+          <p:nvPr/>
+        </p:nvCxnSpPr>
+        <p:spPr>
+          <a:xfrm>
+            <a:off x="6824898" y="4095040"/>
+            <a:ext cx="1598356" cy="7468"/>
+          </a:xfrm>
+          <a:prstGeom prst="straightConnector1">
+            <a:avLst/>
+          </a:prstGeom>
+          <a:ln w="38100">
+            <a:solidFill>
+              <a:schemeClr val="tx1"/>
+            </a:solidFill>
+            <a:headEnd w="lg" len="med"/>
+            <a:tailEnd type="triangle" w="lg" len="med"/>
+          </a:ln>
+        </p:spPr>
+        <p:style>
+          <a:lnRef idx="1">
+            <a:schemeClr val="accent1"/>
+          </a:lnRef>
+          <a:fillRef idx="0">
+            <a:schemeClr val="accent1"/>
+          </a:fillRef>
+          <a:effectRef idx="0">
+            <a:schemeClr val="accent1"/>
+          </a:effectRef>
+          <a:fontRef idx="minor">
+            <a:schemeClr val="tx1"/>
+          </a:fontRef>
+        </p:style>
+      </p:cxnSp>
+    </p:spTree>
+    <p:extLst>
+      <p:ext uri="{BB962C8B-B14F-4D97-AF65-F5344CB8AC3E}">
+        <p14:creationId xmlns:p14="http://schemas.microsoft.com/office/powerpoint/2010/main" val="3261737058"/>
+      </p:ext>
+    </p:extLst>
+  </p:cSld>
+  <p:clrMapOvr>
+    <a:masterClrMapping/>
+  </p:clrMapOvr>
+</p:sld>
+</file>
+
+<file path=ppt/slides/slide4.xml><?xml version="1.0" encoding="utf-8"?>
+<p:sld xmlns:a="http://schemas.openxmlformats.org/drawingml/2006/main" xmlns:r="http://schemas.openxmlformats.org/officeDocument/2006/relationships" xmlns:p="http://schemas.openxmlformats.org/presentationml/2006/main">
+  <p:cSld>
+    <p:spTree>
+      <p:nvGrpSpPr>
+        <p:cNvPr id="1" name=""/>
+        <p:cNvGrpSpPr/>
+        <p:nvPr/>
+      </p:nvGrpSpPr>
+      <p:grpSpPr>
+        <a:xfrm>
+          <a:off x="0" y="0"/>
+          <a:ext cx="0" cy="0"/>
+          <a:chOff x="0" y="0"/>
+          <a:chExt cx="0" cy="0"/>
+        </a:xfrm>
+      </p:grpSpPr>
+      <p:sp>
+        <p:nvSpPr>
+          <p:cNvPr id="2" name="Inhaltsplatzhalter 1">
+            <a:extLst>
+              <a:ext uri="{FF2B5EF4-FFF2-40B4-BE49-F238E27FC236}">
+                <a16:creationId xmlns:a16="http://schemas.microsoft.com/office/drawing/2014/main" id="{2A9E2FC3-3DBB-4BA6-A301-F13511B2859E}"/>
+              </a:ext>
+            </a:extLst>
+          </p:cNvPr>
+          <p:cNvSpPr>
+            <a:spLocks noGrp="1"/>
+          </p:cNvSpPr>
+          <p:nvPr>
+            <p:ph idx="1"/>
+          </p:nvPr>
+        </p:nvSpPr>
+        <p:spPr>
+          <a:xfrm>
+            <a:off x="1924050" y="1201568"/>
+            <a:ext cx="8343900" cy="4694601"/>
+          </a:xfrm>
+        </p:spPr>
+        <p:txBody>
+          <a:bodyPr/>
+          <a:lstStyle/>
+          <a:p>
+            <a:pPr>
+              <a:lnSpc>
+                <a:spcPct val="100000"/>
+              </a:lnSpc>
+            </a:pPr>
+            <a:r>
+              <a:rPr lang="de-DE" dirty="0"/>
+              <a:t>Definition von allen möglichen Datentypen</a:t>
+            </a:r>
+          </a:p>
+          <a:p>
+            <a:pPr>
+              <a:lnSpc>
+                <a:spcPct val="100000"/>
+              </a:lnSpc>
+            </a:pPr>
+            <a:r>
+              <a:rPr lang="de-DE" dirty="0"/>
+              <a:t>3 Einheiten</a:t>
+            </a:r>
+          </a:p>
+          <a:p>
+            <a:pPr>
+              <a:lnSpc>
+                <a:spcPct val="100000"/>
+              </a:lnSpc>
+            </a:pPr>
+            <a:r>
+              <a:rPr lang="de-DE" dirty="0"/>
+              <a:t>Grundlage für</a:t>
+            </a:r>
+          </a:p>
+          <a:p>
+            <a:pPr lvl="1">
+              <a:lnSpc>
+                <a:spcPct val="100000"/>
+              </a:lnSpc>
+            </a:pPr>
+            <a:r>
+              <a:rPr lang="de-DE" dirty="0"/>
+              <a:t>Verfeinern</a:t>
+            </a:r>
+          </a:p>
+          <a:p>
+            <a:pPr lvl="1">
+              <a:lnSpc>
+                <a:spcPct val="100000"/>
+              </a:lnSpc>
+            </a:pPr>
+            <a:r>
+              <a:rPr lang="de-DE" dirty="0"/>
+              <a:t>Konsistenzbedingungen</a:t>
+            </a:r>
+          </a:p>
+        </p:txBody>
+      </p:sp>
+      <p:sp>
+        <p:nvSpPr>
+          <p:cNvPr id="3" name="Titel 2">
+            <a:extLst>
+              <a:ext uri="{FF2B5EF4-FFF2-40B4-BE49-F238E27FC236}">
+                <a16:creationId xmlns:a16="http://schemas.microsoft.com/office/drawing/2014/main" id="{C59BEE1C-2C77-4435-9515-CB9A49F4F4E1}"/>
+              </a:ext>
+            </a:extLst>
+          </p:cNvPr>
+          <p:cNvSpPr>
+            <a:spLocks noGrp="1"/>
+          </p:cNvSpPr>
+          <p:nvPr>
+            <p:ph type="title"/>
+          </p:nvPr>
+        </p:nvSpPr>
+        <p:spPr/>
+        <p:txBody>
+          <a:bodyPr/>
+          <a:lstStyle/>
+          <a:p>
+            <a:r>
+              <a:rPr lang="de-DE" dirty="0"/>
+              <a:t>Data </a:t>
+            </a:r>
+            <a:r>
+              <a:rPr lang="de-DE" dirty="0" err="1"/>
+              <a:t>Dictionary</a:t>
+            </a:r>
+            <a:endParaRPr lang="de-DE" dirty="0"/>
+          </a:p>
+        </p:txBody>
+      </p:sp>
+      <p:sp>
+        <p:nvSpPr>
+          <p:cNvPr id="4" name="Datumsplatzhalter 3">
+            <a:extLst>
+              <a:ext uri="{FF2B5EF4-FFF2-40B4-BE49-F238E27FC236}">
+                <a16:creationId xmlns:a16="http://schemas.microsoft.com/office/drawing/2014/main" id="{5300B1B8-21BF-4F86-B851-AA140F3A571A}"/>
+              </a:ext>
+            </a:extLst>
+          </p:cNvPr>
+          <p:cNvSpPr>
+            <a:spLocks noGrp="1"/>
+          </p:cNvSpPr>
+          <p:nvPr>
+            <p:ph type="dt" sz="half" idx="10"/>
+          </p:nvPr>
+        </p:nvSpPr>
+        <p:spPr/>
+        <p:txBody>
+          <a:bodyPr/>
+          <a:lstStyle/>
+          <a:p>
+            <a:r>
+              <a:rPr lang="de-DE"/>
+              <a:t>25.03.20</a:t>
+            </a:r>
+            <a:endParaRPr lang="de-DE" dirty="0"/>
+          </a:p>
+        </p:txBody>
+      </p:sp>
+      <p:sp>
+        <p:nvSpPr>
+          <p:cNvPr id="5" name="Foliennummernplatzhalter 4">
+            <a:extLst>
+              <a:ext uri="{FF2B5EF4-FFF2-40B4-BE49-F238E27FC236}">
+                <a16:creationId xmlns:a16="http://schemas.microsoft.com/office/drawing/2014/main" id="{34498BD6-DC1C-47AA-B56D-215119930ADD}"/>
+              </a:ext>
+            </a:extLst>
+          </p:cNvPr>
+          <p:cNvSpPr>
+            <a:spLocks noGrp="1"/>
+          </p:cNvSpPr>
+          <p:nvPr>
+            <p:ph type="sldNum" sz="quarter" idx="12"/>
+          </p:nvPr>
+        </p:nvSpPr>
+        <p:spPr/>
+        <p:txBody>
+          <a:bodyPr/>
+          <a:lstStyle/>
+          <a:p>
+            <a:fld id="{03803EE4-0BB8-4A2C-9025-B8F5E159BB3D}" type="slidenum">
+              <a:rPr lang="de-DE" smtClean="0"/>
+              <a:pPr/>
+              <a:t>4</a:t>
+            </a:fld>
+            <a:endParaRPr lang="de-DE" dirty="0"/>
+          </a:p>
+        </p:txBody>
+      </p:sp>
       <p:grpSp>
         <p:nvGrpSpPr>
           <p:cNvPr id="34" name="Gruppieren 33">
@@ -5266,7 +5852,7 @@
         </p:nvGrpSpPr>
         <p:grpSpPr>
           <a:xfrm>
-            <a:off x="5741178" y="4739996"/>
+            <a:off x="7265178" y="4739996"/>
             <a:ext cx="1524000" cy="1028700"/>
             <a:chOff x="2590800" y="4747600"/>
             <a:chExt cx="1524000" cy="1028700"/>
@@ -5361,7 +5947,7 @@
         </p:nvGrpSpPr>
         <p:grpSpPr>
           <a:xfrm>
-            <a:off x="4693422" y="3361788"/>
+            <a:off x="6217422" y="3361788"/>
             <a:ext cx="1524000" cy="1028700"/>
             <a:chOff x="1066800" y="3034517"/>
             <a:chExt cx="1524000" cy="1028700"/>
@@ -5456,7 +6042,7 @@
         </p:nvGrpSpPr>
         <p:grpSpPr>
           <a:xfrm>
-            <a:off x="6869943" y="3057255"/>
+            <a:off x="8393943" y="3057255"/>
             <a:ext cx="1524000" cy="1028700"/>
             <a:chOff x="3810000" y="2914650"/>
             <a:chExt cx="1524000" cy="1028700"/>
@@ -5550,7 +6136,7 @@
 </p:sld>
 </file>
 
-<file path=ppt/slides/slide4.xml><?xml version="1.0" encoding="utf-8"?>
+<file path=ppt/slides/slide5.xml><?xml version="1.0" encoding="utf-8"?>
 <p:sld xmlns:a="http://schemas.openxmlformats.org/drawingml/2006/main" xmlns:r="http://schemas.openxmlformats.org/officeDocument/2006/relationships" xmlns:p="http://schemas.openxmlformats.org/presentationml/2006/main">
   <p:cSld>
     <p:spTree>
@@ -5585,7 +6171,7 @@
         </p:nvSpPr>
         <p:spPr>
           <a:xfrm>
-            <a:off x="400050" y="1201567"/>
+            <a:off x="1924050" y="1201568"/>
             <a:ext cx="8343900" cy="4694601"/>
           </a:xfrm>
         </p:spPr>
@@ -5781,7 +6367,7 @@
             <a:fld id="{03803EE4-0BB8-4A2C-9025-B8F5E159BB3D}" type="slidenum">
               <a:rPr lang="de-DE" smtClean="0"/>
               <a:pPr/>
-              <a:t>4</a:t>
+              <a:t>5</a:t>
             </a:fld>
             <a:endParaRPr lang="de-DE" dirty="0"/>
           </a:p>
@@ -5801,7 +6387,7 @@
         </p:nvSpPr>
         <p:spPr>
           <a:xfrm>
-            <a:off x="400050" y="4180114"/>
+            <a:off x="1924051" y="4180115"/>
             <a:ext cx="612949" cy="311499"/>
           </a:xfrm>
           <a:prstGeom prst="rightArrow">
@@ -5847,7 +6433,7 @@
         </p:nvSpPr>
         <p:spPr>
           <a:xfrm>
-            <a:off x="1012999" y="4145053"/>
+            <a:off x="2537000" y="4145053"/>
             <a:ext cx="4224233" cy="369332"/>
           </a:xfrm>
           <a:prstGeom prst="rect">
@@ -5901,7 +6487,7 @@
 </p:sld>
 </file>
 
-<file path=ppt/slides/slide5.xml><?xml version="1.0" encoding="utf-8"?>
+<file path=ppt/slides/slide6.xml><?xml version="1.0" encoding="utf-8"?>
 <p:sld xmlns:a="http://schemas.openxmlformats.org/drawingml/2006/main" xmlns:r="http://schemas.openxmlformats.org/officeDocument/2006/relationships" xmlns:p="http://schemas.openxmlformats.org/presentationml/2006/main">
   <p:cSld>
     <p:spTree>
@@ -5936,7 +6522,7 @@
         </p:nvSpPr>
         <p:spPr>
           <a:xfrm>
-            <a:off x="400050" y="1201567"/>
+            <a:off x="1924050" y="1201568"/>
             <a:ext cx="8343900" cy="4694601"/>
           </a:xfrm>
         </p:spPr>
@@ -6074,7 +6660,7 @@
             <a:fld id="{03803EE4-0BB8-4A2C-9025-B8F5E159BB3D}" type="slidenum">
               <a:rPr lang="de-DE" smtClean="0"/>
               <a:pPr/>
-              <a:t>5</a:t>
+              <a:t>6</a:t>
             </a:fld>
             <a:endParaRPr lang="de-DE" dirty="0"/>
           </a:p>
@@ -6094,7 +6680,7 @@
         </p:nvGrpSpPr>
         <p:grpSpPr>
           <a:xfrm>
-            <a:off x="2386373" y="3157180"/>
+            <a:off x="3910374" y="3157181"/>
             <a:ext cx="4371253" cy="2658853"/>
             <a:chOff x="3084844" y="3157180"/>
             <a:chExt cx="4371253" cy="2658853"/>
@@ -6333,7 +6919,7 @@
 </p:sld>
 </file>
 
-<file path=ppt/slides/slide6.xml><?xml version="1.0" encoding="utf-8"?>
+<file path=ppt/slides/slide7.xml><?xml version="1.0" encoding="utf-8"?>
 <p:sld xmlns:a="http://schemas.openxmlformats.org/drawingml/2006/main" xmlns:r="http://schemas.openxmlformats.org/officeDocument/2006/relationships" xmlns:p="http://schemas.openxmlformats.org/presentationml/2006/main">
   <p:cSld>
     <p:spTree>
@@ -6368,7 +6954,7 @@
         </p:nvSpPr>
         <p:spPr>
           <a:xfrm>
-            <a:off x="400050" y="1201567"/>
+            <a:off x="1924050" y="1201568"/>
             <a:ext cx="8343900" cy="4694601"/>
           </a:xfrm>
         </p:spPr>
@@ -6466,7 +7052,7 @@
             <a:fld id="{03803EE4-0BB8-4A2C-9025-B8F5E159BB3D}" type="slidenum">
               <a:rPr lang="de-DE" smtClean="0"/>
               <a:pPr/>
-              <a:t>6</a:t>
+              <a:t>7</a:t>
             </a:fld>
             <a:endParaRPr lang="de-DE" dirty="0"/>
           </a:p>
@@ -6476,6 +7062,158 @@
     <p:extLst>
       <p:ext uri="{BB962C8B-B14F-4D97-AF65-F5344CB8AC3E}">
         <p14:creationId xmlns:p14="http://schemas.microsoft.com/office/powerpoint/2010/main" val="3137193833"/>
+      </p:ext>
+    </p:extLst>
+  </p:cSld>
+  <p:clrMapOvr>
+    <a:masterClrMapping/>
+  </p:clrMapOvr>
+</p:sld>
+</file>
+
+<file path=ppt/slides/slide8.xml><?xml version="1.0" encoding="utf-8"?>
+<p:sld xmlns:a="http://schemas.openxmlformats.org/drawingml/2006/main" xmlns:r="http://schemas.openxmlformats.org/officeDocument/2006/relationships" xmlns:p="http://schemas.openxmlformats.org/presentationml/2006/main">
+  <p:cSld>
+    <p:spTree>
+      <p:nvGrpSpPr>
+        <p:cNvPr id="1" name=""/>
+        <p:cNvGrpSpPr/>
+        <p:nvPr/>
+      </p:nvGrpSpPr>
+      <p:grpSpPr>
+        <a:xfrm>
+          <a:off x="0" y="0"/>
+          <a:ext cx="0" cy="0"/>
+          <a:chOff x="0" y="0"/>
+          <a:chExt cx="0" cy="0"/>
+        </a:xfrm>
+      </p:grpSpPr>
+      <p:sp>
+        <p:nvSpPr>
+          <p:cNvPr id="2" name="Inhaltsplatzhalter 1">
+            <a:extLst>
+              <a:ext uri="{FF2B5EF4-FFF2-40B4-BE49-F238E27FC236}">
+                <a16:creationId xmlns:a16="http://schemas.microsoft.com/office/drawing/2014/main" id="{2A9E2FC3-3DBB-4BA6-A301-F13511B2859E}"/>
+              </a:ext>
+            </a:extLst>
+          </p:cNvPr>
+          <p:cNvSpPr>
+            <a:spLocks noGrp="1"/>
+          </p:cNvSpPr>
+          <p:nvPr>
+            <p:ph idx="1"/>
+          </p:nvPr>
+        </p:nvSpPr>
+        <p:spPr>
+          <a:xfrm>
+            <a:off x="1924050" y="1201568"/>
+            <a:ext cx="8343900" cy="4694601"/>
+          </a:xfrm>
+        </p:spPr>
+        <p:txBody>
+          <a:bodyPr/>
+          <a:lstStyle/>
+          <a:p>
+            <a:pPr>
+              <a:lnSpc>
+                <a:spcPct val="100000"/>
+              </a:lnSpc>
+            </a:pPr>
+            <a:endParaRPr lang="de-DE" dirty="0"/>
+          </a:p>
+        </p:txBody>
+      </p:sp>
+      <p:sp>
+        <p:nvSpPr>
+          <p:cNvPr id="3" name="Titel 2">
+            <a:extLst>
+              <a:ext uri="{FF2B5EF4-FFF2-40B4-BE49-F238E27FC236}">
+                <a16:creationId xmlns:a16="http://schemas.microsoft.com/office/drawing/2014/main" id="{C59BEE1C-2C77-4435-9515-CB9A49F4F4E1}"/>
+              </a:ext>
+            </a:extLst>
+          </p:cNvPr>
+          <p:cNvSpPr>
+            <a:spLocks noGrp="1"/>
+          </p:cNvSpPr>
+          <p:nvPr>
+            <p:ph type="title"/>
+          </p:nvPr>
+        </p:nvSpPr>
+        <p:spPr/>
+        <p:txBody>
+          <a:bodyPr/>
+          <a:lstStyle/>
+          <a:p>
+            <a:r>
+              <a:rPr lang="de-DE" dirty="0"/>
+              <a:t>Zusammenfassung</a:t>
+            </a:r>
+          </a:p>
+        </p:txBody>
+      </p:sp>
+      <p:sp>
+        <p:nvSpPr>
+          <p:cNvPr id="4" name="Datumsplatzhalter 3">
+            <a:extLst>
+              <a:ext uri="{FF2B5EF4-FFF2-40B4-BE49-F238E27FC236}">
+                <a16:creationId xmlns:a16="http://schemas.microsoft.com/office/drawing/2014/main" id="{5300B1B8-21BF-4F86-B851-AA140F3A571A}"/>
+              </a:ext>
+            </a:extLst>
+          </p:cNvPr>
+          <p:cNvSpPr>
+            <a:spLocks noGrp="1"/>
+          </p:cNvSpPr>
+          <p:nvPr>
+            <p:ph type="dt" sz="half" idx="10"/>
+          </p:nvPr>
+        </p:nvSpPr>
+        <p:spPr/>
+        <p:txBody>
+          <a:bodyPr/>
+          <a:lstStyle/>
+          <a:p>
+            <a:r>
+              <a:rPr lang="de-DE"/>
+              <a:t>25.03.20</a:t>
+            </a:r>
+            <a:endParaRPr lang="de-DE" dirty="0"/>
+          </a:p>
+        </p:txBody>
+      </p:sp>
+      <p:sp>
+        <p:nvSpPr>
+          <p:cNvPr id="5" name="Foliennummernplatzhalter 4">
+            <a:extLst>
+              <a:ext uri="{FF2B5EF4-FFF2-40B4-BE49-F238E27FC236}">
+                <a16:creationId xmlns:a16="http://schemas.microsoft.com/office/drawing/2014/main" id="{34498BD6-DC1C-47AA-B56D-215119930ADD}"/>
+              </a:ext>
+            </a:extLst>
+          </p:cNvPr>
+          <p:cNvSpPr>
+            <a:spLocks noGrp="1"/>
+          </p:cNvSpPr>
+          <p:nvPr>
+            <p:ph type="sldNum" sz="quarter" idx="12"/>
+          </p:nvPr>
+        </p:nvSpPr>
+        <p:spPr/>
+        <p:txBody>
+          <a:bodyPr/>
+          <a:lstStyle/>
+          <a:p>
+            <a:fld id="{03803EE4-0BB8-4A2C-9025-B8F5E159BB3D}" type="slidenum">
+              <a:rPr lang="de-DE" smtClean="0"/>
+              <a:pPr/>
+              <a:t>8</a:t>
+            </a:fld>
+            <a:endParaRPr lang="de-DE" dirty="0"/>
+          </a:p>
+        </p:txBody>
+      </p:sp>
+    </p:spTree>
+    <p:extLst>
+      <p:ext uri="{BB962C8B-B14F-4D97-AF65-F5344CB8AC3E}">
+        <p14:creationId xmlns:p14="http://schemas.microsoft.com/office/powerpoint/2010/main" val="3995404139"/>
       </p:ext>
     </p:extLst>
   </p:cSld>

</xml_diff>

<commit_message>
add widescreen presentation slides
</commit_message>
<xml_diff>
--- a/presentation/presentation.pptx
+++ b/presentation/presentation.pptx
@@ -5,7 +5,7 @@
     <p:sldMasterId id="2147483660" r:id="rId1"/>
   </p:sldMasterIdLst>
   <p:notesMasterIdLst>
-    <p:notesMasterId r:id="rId10"/>
+    <p:notesMasterId r:id="rId12"/>
   </p:notesMasterIdLst>
   <p:sldIdLst>
     <p:sldId id="256" r:id="rId2"/>
@@ -15,7 +15,9 @@
     <p:sldId id="260" r:id="rId6"/>
     <p:sldId id="258" r:id="rId7"/>
     <p:sldId id="261" r:id="rId8"/>
-    <p:sldId id="263" r:id="rId9"/>
+    <p:sldId id="264" r:id="rId9"/>
+    <p:sldId id="265" r:id="rId10"/>
+    <p:sldId id="263" r:id="rId11"/>
   </p:sldIdLst>
   <p:sldSz cx="12192000" cy="6858000"/>
   <p:notesSz cx="6858000" cy="9144000"/>
@@ -204,7 +206,7 @@
           <a:p>
             <a:fld id="{97654B1D-6E8F-4B2A-9B0B-F346A8212316}" type="datetimeFigureOut">
               <a:rPr lang="de-DE" smtClean="0"/>
-              <a:t>02.03.20</a:t>
+              <a:t>06.03.20</a:t>
             </a:fld>
             <a:endParaRPr lang="de-DE"/>
           </a:p>
@@ -4523,6 +4525,158 @@
 </p:sld>
 </file>
 
+<file path=ppt/slides/slide10.xml><?xml version="1.0" encoding="utf-8"?>
+<p:sld xmlns:a="http://schemas.openxmlformats.org/drawingml/2006/main" xmlns:r="http://schemas.openxmlformats.org/officeDocument/2006/relationships" xmlns:p="http://schemas.openxmlformats.org/presentationml/2006/main">
+  <p:cSld>
+    <p:spTree>
+      <p:nvGrpSpPr>
+        <p:cNvPr id="1" name=""/>
+        <p:cNvGrpSpPr/>
+        <p:nvPr/>
+      </p:nvGrpSpPr>
+      <p:grpSpPr>
+        <a:xfrm>
+          <a:off x="0" y="0"/>
+          <a:ext cx="0" cy="0"/>
+          <a:chOff x="0" y="0"/>
+          <a:chExt cx="0" cy="0"/>
+        </a:xfrm>
+      </p:grpSpPr>
+      <p:sp>
+        <p:nvSpPr>
+          <p:cNvPr id="2" name="Inhaltsplatzhalter 1">
+            <a:extLst>
+              <a:ext uri="{FF2B5EF4-FFF2-40B4-BE49-F238E27FC236}">
+                <a16:creationId xmlns:a16="http://schemas.microsoft.com/office/drawing/2014/main" id="{2A9E2FC3-3DBB-4BA6-A301-F13511B2859E}"/>
+              </a:ext>
+            </a:extLst>
+          </p:cNvPr>
+          <p:cNvSpPr>
+            <a:spLocks noGrp="1"/>
+          </p:cNvSpPr>
+          <p:nvPr>
+            <p:ph idx="1"/>
+          </p:nvPr>
+        </p:nvSpPr>
+        <p:spPr>
+          <a:xfrm>
+            <a:off x="1924050" y="1201568"/>
+            <a:ext cx="8343900" cy="4694601"/>
+          </a:xfrm>
+        </p:spPr>
+        <p:txBody>
+          <a:bodyPr/>
+          <a:lstStyle/>
+          <a:p>
+            <a:pPr>
+              <a:lnSpc>
+                <a:spcPct val="100000"/>
+              </a:lnSpc>
+            </a:pPr>
+            <a:endParaRPr lang="de-DE" dirty="0"/>
+          </a:p>
+        </p:txBody>
+      </p:sp>
+      <p:sp>
+        <p:nvSpPr>
+          <p:cNvPr id="3" name="Titel 2">
+            <a:extLst>
+              <a:ext uri="{FF2B5EF4-FFF2-40B4-BE49-F238E27FC236}">
+                <a16:creationId xmlns:a16="http://schemas.microsoft.com/office/drawing/2014/main" id="{C59BEE1C-2C77-4435-9515-CB9A49F4F4E1}"/>
+              </a:ext>
+            </a:extLst>
+          </p:cNvPr>
+          <p:cNvSpPr>
+            <a:spLocks noGrp="1"/>
+          </p:cNvSpPr>
+          <p:nvPr>
+            <p:ph type="title"/>
+          </p:nvPr>
+        </p:nvSpPr>
+        <p:spPr/>
+        <p:txBody>
+          <a:bodyPr/>
+          <a:lstStyle/>
+          <a:p>
+            <a:r>
+              <a:rPr lang="de-DE" dirty="0"/>
+              <a:t>Zusammenfassung</a:t>
+            </a:r>
+          </a:p>
+        </p:txBody>
+      </p:sp>
+      <p:sp>
+        <p:nvSpPr>
+          <p:cNvPr id="4" name="Datumsplatzhalter 3">
+            <a:extLst>
+              <a:ext uri="{FF2B5EF4-FFF2-40B4-BE49-F238E27FC236}">
+                <a16:creationId xmlns:a16="http://schemas.microsoft.com/office/drawing/2014/main" id="{5300B1B8-21BF-4F86-B851-AA140F3A571A}"/>
+              </a:ext>
+            </a:extLst>
+          </p:cNvPr>
+          <p:cNvSpPr>
+            <a:spLocks noGrp="1"/>
+          </p:cNvSpPr>
+          <p:nvPr>
+            <p:ph type="dt" sz="half" idx="10"/>
+          </p:nvPr>
+        </p:nvSpPr>
+        <p:spPr/>
+        <p:txBody>
+          <a:bodyPr/>
+          <a:lstStyle/>
+          <a:p>
+            <a:r>
+              <a:rPr lang="de-DE"/>
+              <a:t>25.03.20</a:t>
+            </a:r>
+            <a:endParaRPr lang="de-DE" dirty="0"/>
+          </a:p>
+        </p:txBody>
+      </p:sp>
+      <p:sp>
+        <p:nvSpPr>
+          <p:cNvPr id="5" name="Foliennummernplatzhalter 4">
+            <a:extLst>
+              <a:ext uri="{FF2B5EF4-FFF2-40B4-BE49-F238E27FC236}">
+                <a16:creationId xmlns:a16="http://schemas.microsoft.com/office/drawing/2014/main" id="{34498BD6-DC1C-47AA-B56D-215119930ADD}"/>
+              </a:ext>
+            </a:extLst>
+          </p:cNvPr>
+          <p:cNvSpPr>
+            <a:spLocks noGrp="1"/>
+          </p:cNvSpPr>
+          <p:nvPr>
+            <p:ph type="sldNum" sz="quarter" idx="12"/>
+          </p:nvPr>
+        </p:nvSpPr>
+        <p:spPr/>
+        <p:txBody>
+          <a:bodyPr/>
+          <a:lstStyle/>
+          <a:p>
+            <a:fld id="{03803EE4-0BB8-4A2C-9025-B8F5E159BB3D}" type="slidenum">
+              <a:rPr lang="de-DE" smtClean="0"/>
+              <a:pPr/>
+              <a:t>10</a:t>
+            </a:fld>
+            <a:endParaRPr lang="de-DE" dirty="0"/>
+          </a:p>
+        </p:txBody>
+      </p:sp>
+    </p:spTree>
+    <p:extLst>
+      <p:ext uri="{BB962C8B-B14F-4D97-AF65-F5344CB8AC3E}">
+        <p14:creationId xmlns:p14="http://schemas.microsoft.com/office/powerpoint/2010/main" val="3995404139"/>
+      </p:ext>
+    </p:extLst>
+  </p:cSld>
+  <p:clrMapOvr>
+    <a:masterClrMapping/>
+  </p:clrMapOvr>
+</p:sld>
+</file>
+
 <file path=ppt/slides/slide2.xml><?xml version="1.0" encoding="utf-8"?>
 <p:sld xmlns:a="http://schemas.openxmlformats.org/drawingml/2006/main" xmlns:r="http://schemas.openxmlformats.org/officeDocument/2006/relationships" xmlns:p="http://schemas.openxmlformats.org/presentationml/2006/main">
   <p:cSld>
@@ -7119,8 +7273,132 @@
                 <a:spcPct val="100000"/>
               </a:lnSpc>
             </a:pPr>
+            <a:r>
+              <a:rPr lang="de-DE" dirty="0" err="1"/>
+              <a:t>Generate</a:t>
+            </a:r>
+            <a:r>
+              <a:rPr lang="de-DE" dirty="0"/>
+              <a:t> </a:t>
+            </a:r>
+            <a:r>
+              <a:rPr lang="de-DE" dirty="0" err="1"/>
+              <a:t>and</a:t>
+            </a:r>
+            <a:r>
+              <a:rPr lang="de-DE" dirty="0"/>
+              <a:t> Test - Paradigma</a:t>
+            </a:r>
+          </a:p>
+          <a:p>
+            <a:pPr>
+              <a:lnSpc>
+                <a:spcPct val="100000"/>
+              </a:lnSpc>
+            </a:pPr>
+            <a:r>
+              <a:rPr lang="de-DE" dirty="0"/>
+              <a:t>Baumaufbau</a:t>
+            </a:r>
+          </a:p>
+          <a:p>
+            <a:pPr>
+              <a:lnSpc>
+                <a:spcPct val="100000"/>
+              </a:lnSpc>
+            </a:pPr>
+            <a:r>
+              <a:rPr lang="de-DE" dirty="0"/>
+              <a:t>Nutzereingabe </a:t>
+            </a:r>
+            <a:r>
+              <a:rPr lang="de-DE"/>
+              <a:t>erschwert Analyse</a:t>
+            </a:r>
             <a:endParaRPr lang="de-DE" dirty="0"/>
           </a:p>
+          <a:p>
+            <a:pPr>
+              <a:lnSpc>
+                <a:spcPct val="100000"/>
+              </a:lnSpc>
+            </a:pPr>
+            <a:r>
+              <a:rPr lang="de-DE" dirty="0"/>
+              <a:t>Future Work:</a:t>
+            </a:r>
+          </a:p>
+          <a:p>
+            <a:pPr lvl="1">
+              <a:lnSpc>
+                <a:spcPct val="100000"/>
+              </a:lnSpc>
+            </a:pPr>
+            <a:r>
+              <a:rPr lang="de-DE" dirty="0"/>
+              <a:t>Early </a:t>
+            </a:r>
+            <a:r>
+              <a:rPr lang="de-DE" dirty="0" err="1"/>
+              <a:t>Pruning</a:t>
+            </a:r>
+            <a:endParaRPr lang="de-DE" dirty="0"/>
+          </a:p>
+          <a:p>
+            <a:pPr lvl="2">
+              <a:lnSpc>
+                <a:spcPct val="100000"/>
+              </a:lnSpc>
+            </a:pPr>
+            <a:r>
+              <a:rPr lang="de-DE" dirty="0"/>
+              <a:t>Fortgeschrittene Problemanalyse: Herleitung von Bedingungen</a:t>
+            </a:r>
+          </a:p>
+          <a:p>
+            <a:pPr lvl="2">
+              <a:lnSpc>
+                <a:spcPct val="100000"/>
+              </a:lnSpc>
+            </a:pPr>
+            <a:r>
+              <a:rPr lang="de-DE" dirty="0"/>
+              <a:t>Spezielle Datenstrukturen ...</a:t>
+            </a:r>
+          </a:p>
+          <a:p>
+            <a:pPr lvl="1">
+              <a:lnSpc>
+                <a:spcPct val="100000"/>
+              </a:lnSpc>
+            </a:pPr>
+            <a:r>
+              <a:rPr lang="de-DE" dirty="0"/>
+              <a:t>Schrittweite</a:t>
+            </a:r>
+          </a:p>
+          <a:p>
+            <a:pPr lvl="1">
+              <a:lnSpc>
+                <a:spcPct val="100000"/>
+              </a:lnSpc>
+            </a:pPr>
+            <a:r>
+              <a:rPr lang="de-DE" dirty="0"/>
+              <a:t>Vorberechnung</a:t>
+            </a:r>
+          </a:p>
+          <a:p>
+            <a:pPr lvl="1">
+              <a:lnSpc>
+                <a:spcPct val="100000"/>
+              </a:lnSpc>
+            </a:pPr>
+            <a:r>
+              <a:rPr lang="de-DE" dirty="0"/>
+              <a:t>Notwendiges vs. Hinreichende Kriterien</a:t>
+            </a:r>
+          </a:p>
         </p:txBody>
       </p:sp>
       <p:sp>
@@ -7146,7 +7424,7 @@
           <a:p>
             <a:r>
               <a:rPr lang="de-DE" dirty="0"/>
-              <a:t>Zusammenfassung</a:t>
+              <a:t>Validierung</a:t>
             </a:r>
           </a:p>
         </p:txBody>
@@ -7213,7 +7491,176 @@
     </p:spTree>
     <p:extLst>
       <p:ext uri="{BB962C8B-B14F-4D97-AF65-F5344CB8AC3E}">
-        <p14:creationId xmlns:p14="http://schemas.microsoft.com/office/powerpoint/2010/main" val="3995404139"/>
+        <p14:creationId xmlns:p14="http://schemas.microsoft.com/office/powerpoint/2010/main" val="3876969312"/>
+      </p:ext>
+    </p:extLst>
+  </p:cSld>
+  <p:clrMapOvr>
+    <a:masterClrMapping/>
+  </p:clrMapOvr>
+</p:sld>
+</file>
+
+<file path=ppt/slides/slide9.xml><?xml version="1.0" encoding="utf-8"?>
+<p:sld xmlns:a="http://schemas.openxmlformats.org/drawingml/2006/main" xmlns:r="http://schemas.openxmlformats.org/officeDocument/2006/relationships" xmlns:p="http://schemas.openxmlformats.org/presentationml/2006/main">
+  <p:cSld>
+    <p:spTree>
+      <p:nvGrpSpPr>
+        <p:cNvPr id="1" name=""/>
+        <p:cNvGrpSpPr/>
+        <p:nvPr/>
+      </p:nvGrpSpPr>
+      <p:grpSpPr>
+        <a:xfrm>
+          <a:off x="0" y="0"/>
+          <a:ext cx="0" cy="0"/>
+          <a:chOff x="0" y="0"/>
+          <a:chExt cx="0" cy="0"/>
+        </a:xfrm>
+      </p:grpSpPr>
+      <p:sp>
+        <p:nvSpPr>
+          <p:cNvPr id="2" name="Inhaltsplatzhalter 1">
+            <a:extLst>
+              <a:ext uri="{FF2B5EF4-FFF2-40B4-BE49-F238E27FC236}">
+                <a16:creationId xmlns:a16="http://schemas.microsoft.com/office/drawing/2014/main" id="{2A9E2FC3-3DBB-4BA6-A301-F13511B2859E}"/>
+              </a:ext>
+            </a:extLst>
+          </p:cNvPr>
+          <p:cNvSpPr>
+            <a:spLocks noGrp="1"/>
+          </p:cNvSpPr>
+          <p:nvPr>
+            <p:ph idx="1"/>
+          </p:nvPr>
+        </p:nvSpPr>
+        <p:spPr>
+          <a:xfrm>
+            <a:off x="1924050" y="1201568"/>
+            <a:ext cx="8343900" cy="4694601"/>
+          </a:xfrm>
+        </p:spPr>
+        <p:txBody>
+          <a:bodyPr/>
+          <a:lstStyle/>
+          <a:p>
+            <a:pPr>
+              <a:lnSpc>
+                <a:spcPct val="100000"/>
+              </a:lnSpc>
+            </a:pPr>
+            <a:r>
+              <a:rPr lang="de-DE" dirty="0"/>
+              <a:t>Unterteilung </a:t>
+            </a:r>
+            <a:r>
+              <a:rPr lang="de-DE" dirty="0" err="1"/>
+              <a:t>Border</a:t>
+            </a:r>
+            <a:r>
+              <a:rPr lang="de-DE" dirty="0"/>
+              <a:t> vs. </a:t>
+            </a:r>
+            <a:r>
+              <a:rPr lang="de-DE" dirty="0" err="1"/>
+              <a:t>Inner</a:t>
+            </a:r>
+            <a:endParaRPr lang="de-DE" dirty="0"/>
+          </a:p>
+        </p:txBody>
+      </p:sp>
+      <p:sp>
+        <p:nvSpPr>
+          <p:cNvPr id="3" name="Titel 2">
+            <a:extLst>
+              <a:ext uri="{FF2B5EF4-FFF2-40B4-BE49-F238E27FC236}">
+                <a16:creationId xmlns:a16="http://schemas.microsoft.com/office/drawing/2014/main" id="{C59BEE1C-2C77-4435-9515-CB9A49F4F4E1}"/>
+              </a:ext>
+            </a:extLst>
+          </p:cNvPr>
+          <p:cNvSpPr>
+            <a:spLocks noGrp="1"/>
+          </p:cNvSpPr>
+          <p:nvPr>
+            <p:ph type="title"/>
+          </p:nvPr>
+        </p:nvSpPr>
+        <p:spPr/>
+        <p:txBody>
+          <a:bodyPr/>
+          <a:lstStyle/>
+          <a:p>
+            <a:r>
+              <a:rPr lang="de-DE" dirty="0" err="1"/>
+              <a:t>Leveling</a:t>
+            </a:r>
+            <a:endParaRPr lang="de-DE" dirty="0"/>
+          </a:p>
+        </p:txBody>
+      </p:sp>
+      <p:sp>
+        <p:nvSpPr>
+          <p:cNvPr id="4" name="Datumsplatzhalter 3">
+            <a:extLst>
+              <a:ext uri="{FF2B5EF4-FFF2-40B4-BE49-F238E27FC236}">
+                <a16:creationId xmlns:a16="http://schemas.microsoft.com/office/drawing/2014/main" id="{5300B1B8-21BF-4F86-B851-AA140F3A571A}"/>
+              </a:ext>
+            </a:extLst>
+          </p:cNvPr>
+          <p:cNvSpPr>
+            <a:spLocks noGrp="1"/>
+          </p:cNvSpPr>
+          <p:nvPr>
+            <p:ph type="dt" sz="half" idx="10"/>
+          </p:nvPr>
+        </p:nvSpPr>
+        <p:spPr/>
+        <p:txBody>
+          <a:bodyPr/>
+          <a:lstStyle/>
+          <a:p>
+            <a:r>
+              <a:rPr lang="de-DE"/>
+              <a:t>25.03.20</a:t>
+            </a:r>
+            <a:endParaRPr lang="de-DE" dirty="0"/>
+          </a:p>
+        </p:txBody>
+      </p:sp>
+      <p:sp>
+        <p:nvSpPr>
+          <p:cNvPr id="5" name="Foliennummernplatzhalter 4">
+            <a:extLst>
+              <a:ext uri="{FF2B5EF4-FFF2-40B4-BE49-F238E27FC236}">
+                <a16:creationId xmlns:a16="http://schemas.microsoft.com/office/drawing/2014/main" id="{34498BD6-DC1C-47AA-B56D-215119930ADD}"/>
+              </a:ext>
+            </a:extLst>
+          </p:cNvPr>
+          <p:cNvSpPr>
+            <a:spLocks noGrp="1"/>
+          </p:cNvSpPr>
+          <p:nvPr>
+            <p:ph type="sldNum" sz="quarter" idx="12"/>
+          </p:nvPr>
+        </p:nvSpPr>
+        <p:spPr/>
+        <p:txBody>
+          <a:bodyPr/>
+          <a:lstStyle/>
+          <a:p>
+            <a:fld id="{03803EE4-0BB8-4A2C-9025-B8F5E159BB3D}" type="slidenum">
+              <a:rPr lang="de-DE" smtClean="0"/>
+              <a:pPr/>
+              <a:t>9</a:t>
+            </a:fld>
+            <a:endParaRPr lang="de-DE" dirty="0"/>
+          </a:p>
+        </p:txBody>
+      </p:sp>
+    </p:spTree>
+    <p:extLst>
+      <p:ext uri="{BB962C8B-B14F-4D97-AF65-F5344CB8AC3E}">
+        <p14:creationId xmlns:p14="http://schemas.microsoft.com/office/powerpoint/2010/main" val="3101152024"/>
       </p:ext>
     </p:extLst>
   </p:cSld>

</xml_diff>